<commit_message>
se agrego a Riva
</commit_message>
<xml_diff>
--- a/imagenes/fotos_conferencistas/fotos_conferencistas.pptx
+++ b/imagenes/fotos_conferencistas/fotos_conferencistas.pptx
@@ -10,6 +10,7 @@
     <p:sldId id="261" r:id="rId4"/>
     <p:sldId id="262" r:id="rId5"/>
     <p:sldId id="263" r:id="rId6"/>
+    <p:sldId id="264" r:id="rId7"/>
   </p:sldIdLst>
   <p:sldSz cx="9144000" cy="6858000" type="screen4x3"/>
   <p:notesSz cx="6858000" cy="9144000"/>
@@ -306,7 +307,7 @@
           <a:p>
             <a:fld id="{A024B3BE-3465-4E30-B4C9-D82950137A0E}" type="datetimeFigureOut">
               <a:rPr lang="pt-BR" smtClean="0"/>
-              <a:t>19/05/2023</a:t>
+              <a:t>27/07/2023</a:t>
             </a:fld>
             <a:endParaRPr lang="pt-BR"/>
           </a:p>
@@ -474,7 +475,7 @@
           <a:p>
             <a:fld id="{A024B3BE-3465-4E30-B4C9-D82950137A0E}" type="datetimeFigureOut">
               <a:rPr lang="pt-BR" smtClean="0"/>
-              <a:t>19/05/2023</a:t>
+              <a:t>27/07/2023</a:t>
             </a:fld>
             <a:endParaRPr lang="pt-BR"/>
           </a:p>
@@ -652,7 +653,7 @@
           <a:p>
             <a:fld id="{A024B3BE-3465-4E30-B4C9-D82950137A0E}" type="datetimeFigureOut">
               <a:rPr lang="pt-BR" smtClean="0"/>
-              <a:t>19/05/2023</a:t>
+              <a:t>27/07/2023</a:t>
             </a:fld>
             <a:endParaRPr lang="pt-BR"/>
           </a:p>
@@ -820,7 +821,7 @@
           <a:p>
             <a:fld id="{A024B3BE-3465-4E30-B4C9-D82950137A0E}" type="datetimeFigureOut">
               <a:rPr lang="pt-BR" smtClean="0"/>
-              <a:t>19/05/2023</a:t>
+              <a:t>27/07/2023</a:t>
             </a:fld>
             <a:endParaRPr lang="pt-BR"/>
           </a:p>
@@ -1065,7 +1066,7 @@
           <a:p>
             <a:fld id="{A024B3BE-3465-4E30-B4C9-D82950137A0E}" type="datetimeFigureOut">
               <a:rPr lang="pt-BR" smtClean="0"/>
-              <a:t>19/05/2023</a:t>
+              <a:t>27/07/2023</a:t>
             </a:fld>
             <a:endParaRPr lang="pt-BR"/>
           </a:p>
@@ -1350,7 +1351,7 @@
           <a:p>
             <a:fld id="{A024B3BE-3465-4E30-B4C9-D82950137A0E}" type="datetimeFigureOut">
               <a:rPr lang="pt-BR" smtClean="0"/>
-              <a:t>19/05/2023</a:t>
+              <a:t>27/07/2023</a:t>
             </a:fld>
             <a:endParaRPr lang="pt-BR"/>
           </a:p>
@@ -1769,7 +1770,7 @@
           <a:p>
             <a:fld id="{A024B3BE-3465-4E30-B4C9-D82950137A0E}" type="datetimeFigureOut">
               <a:rPr lang="pt-BR" smtClean="0"/>
-              <a:t>19/05/2023</a:t>
+              <a:t>27/07/2023</a:t>
             </a:fld>
             <a:endParaRPr lang="pt-BR"/>
           </a:p>
@@ -1886,7 +1887,7 @@
           <a:p>
             <a:fld id="{A024B3BE-3465-4E30-B4C9-D82950137A0E}" type="datetimeFigureOut">
               <a:rPr lang="pt-BR" smtClean="0"/>
-              <a:t>19/05/2023</a:t>
+              <a:t>27/07/2023</a:t>
             </a:fld>
             <a:endParaRPr lang="pt-BR"/>
           </a:p>
@@ -1981,7 +1982,7 @@
           <a:p>
             <a:fld id="{A024B3BE-3465-4E30-B4C9-D82950137A0E}" type="datetimeFigureOut">
               <a:rPr lang="pt-BR" smtClean="0"/>
-              <a:t>19/05/2023</a:t>
+              <a:t>27/07/2023</a:t>
             </a:fld>
             <a:endParaRPr lang="pt-BR"/>
           </a:p>
@@ -2256,7 +2257,7 @@
           <a:p>
             <a:fld id="{A024B3BE-3465-4E30-B4C9-D82950137A0E}" type="datetimeFigureOut">
               <a:rPr lang="pt-BR" smtClean="0"/>
-              <a:t>19/05/2023</a:t>
+              <a:t>27/07/2023</a:t>
             </a:fld>
             <a:endParaRPr lang="pt-BR"/>
           </a:p>
@@ -2508,7 +2509,7 @@
           <a:p>
             <a:fld id="{A024B3BE-3465-4E30-B4C9-D82950137A0E}" type="datetimeFigureOut">
               <a:rPr lang="pt-BR" smtClean="0"/>
-              <a:t>19/05/2023</a:t>
+              <a:t>27/07/2023</a:t>
             </a:fld>
             <a:endParaRPr lang="pt-BR"/>
           </a:p>
@@ -2719,7 +2720,7 @@
           <a:p>
             <a:fld id="{A024B3BE-3465-4E30-B4C9-D82950137A0E}" type="datetimeFigureOut">
               <a:rPr lang="pt-BR" smtClean="0"/>
-              <a:t>19/05/2023</a:t>
+              <a:t>27/07/2023</a:t>
             </a:fld>
             <a:endParaRPr lang="pt-BR"/>
           </a:p>
@@ -3455,6 +3456,88 @@
 </p:sld>
 </file>
 
+<file path=ppt/slides/slide6.xml><?xml version="1.0" encoding="utf-8"?>
+<p:sld xmlns:a="http://schemas.openxmlformats.org/drawingml/2006/main" xmlns:r="http://schemas.openxmlformats.org/officeDocument/2006/relationships" xmlns:p="http://schemas.openxmlformats.org/presentationml/2006/main">
+  <p:cSld>
+    <p:spTree>
+      <p:nvGrpSpPr>
+        <p:cNvPr id="1" name=""/>
+        <p:cNvGrpSpPr/>
+        <p:nvPr/>
+      </p:nvGrpSpPr>
+      <p:grpSpPr>
+        <a:xfrm>
+          <a:off x="0" y="0"/>
+          <a:ext cx="0" cy="0"/>
+          <a:chOff x="0" y="0"/>
+          <a:chExt cx="0" cy="0"/>
+        </a:xfrm>
+      </p:grpSpPr>
+      <p:pic>
+        <p:nvPicPr>
+          <p:cNvPr id="1026" name="Picture 2" descr="Image">
+            <a:extLst>
+              <a:ext uri="{FF2B5EF4-FFF2-40B4-BE49-F238E27FC236}">
+                <a16:creationId xmlns:a16="http://schemas.microsoft.com/office/drawing/2014/main" id="{C9B63AD0-EFDC-E5CD-5A2F-9D138EF2A737}"/>
+              </a:ext>
+            </a:extLst>
+          </p:cNvPr>
+          <p:cNvPicPr>
+            <a:picLocks noChangeAspect="1" noChangeArrowheads="1"/>
+          </p:cNvPicPr>
+          <p:nvPr/>
+        </p:nvPicPr>
+        <p:blipFill>
+          <a:blip r:embed="rId2">
+            <a:extLst>
+              <a:ext uri="{28A0092B-C50C-407E-A947-70E740481C1C}">
+                <a14:useLocalDpi xmlns:a14="http://schemas.microsoft.com/office/drawing/2010/main" val="0"/>
+              </a:ext>
+            </a:extLst>
+          </a:blip>
+          <a:srcRect/>
+          <a:stretch>
+            <a:fillRect/>
+          </a:stretch>
+        </p:blipFill>
+        <p:spPr bwMode="auto">
+          <a:xfrm>
+            <a:off x="2458559" y="1052736"/>
+            <a:ext cx="4226882" cy="4226882"/>
+          </a:xfrm>
+          <a:prstGeom prst="ellipse">
+            <a:avLst/>
+          </a:prstGeom>
+          <a:ln>
+            <a:noFill/>
+          </a:ln>
+          <a:effectLst>
+            <a:softEdge rad="112500"/>
+          </a:effectLst>
+          <a:extLst>
+            <a:ext uri="{909E8E84-426E-40DD-AFC4-6F175D3DCCD1}">
+              <a14:hiddenFill xmlns:a14="http://schemas.microsoft.com/office/drawing/2010/main">
+                <a:solidFill>
+                  <a:srgbClr val="FFFFFF"/>
+                </a:solidFill>
+              </a14:hiddenFill>
+            </a:ext>
+          </a:extLst>
+        </p:spPr>
+      </p:pic>
+    </p:spTree>
+    <p:extLst>
+      <p:ext uri="{BB962C8B-B14F-4D97-AF65-F5344CB8AC3E}">
+        <p14:creationId xmlns:p14="http://schemas.microsoft.com/office/powerpoint/2010/main" val="2064948399"/>
+      </p:ext>
+    </p:extLst>
+  </p:cSld>
+  <p:clrMapOvr>
+    <a:masterClrMapping/>
+  </p:clrMapOvr>
+</p:sld>
+</file>
+
 <file path=ppt/theme/theme1.xml><?xml version="1.0" encoding="utf-8"?>
 <a:theme xmlns:a="http://schemas.openxmlformats.org/drawingml/2006/main" name="Tema do Office">
   <a:themeElements>

</xml_diff>

<commit_message>
Se agrego a Yanina
</commit_message>
<xml_diff>
--- a/imagenes/fotos_conferencistas/fotos_conferencistas.pptx
+++ b/imagenes/fotos_conferencistas/fotos_conferencistas.pptx
@@ -11,6 +11,7 @@
     <p:sldId id="262" r:id="rId5"/>
     <p:sldId id="263" r:id="rId6"/>
     <p:sldId id="264" r:id="rId7"/>
+    <p:sldId id="265" r:id="rId8"/>
   </p:sldIdLst>
   <p:sldSz cx="9144000" cy="6858000" type="screen4x3"/>
   <p:notesSz cx="6858000" cy="9144000"/>
@@ -3538,6 +3539,88 @@
 </p:sld>
 </file>
 
+<file path=ppt/slides/slide7.xml><?xml version="1.0" encoding="utf-8"?>
+<p:sld xmlns:a="http://schemas.openxmlformats.org/drawingml/2006/main" xmlns:r="http://schemas.openxmlformats.org/officeDocument/2006/relationships" xmlns:p="http://schemas.openxmlformats.org/presentationml/2006/main">
+  <p:cSld>
+    <p:spTree>
+      <p:nvGrpSpPr>
+        <p:cNvPr id="1" name=""/>
+        <p:cNvGrpSpPr/>
+        <p:nvPr/>
+      </p:nvGrpSpPr>
+      <p:grpSpPr>
+        <a:xfrm>
+          <a:off x="0" y="0"/>
+          <a:ext cx="0" cy="0"/>
+          <a:chOff x="0" y="0"/>
+          <a:chExt cx="0" cy="0"/>
+        </a:xfrm>
+      </p:grpSpPr>
+      <p:pic>
+        <p:nvPicPr>
+          <p:cNvPr id="1028" name="Picture 4" descr="Image">
+            <a:extLst>
+              <a:ext uri="{FF2B5EF4-FFF2-40B4-BE49-F238E27FC236}">
+                <a16:creationId xmlns:a16="http://schemas.microsoft.com/office/drawing/2014/main" id="{2F4ACF8D-B8B2-C5A8-DEC9-4C4B55B48D64}"/>
+              </a:ext>
+            </a:extLst>
+          </p:cNvPr>
+          <p:cNvPicPr>
+            <a:picLocks noChangeAspect="1" noChangeArrowheads="1"/>
+          </p:cNvPicPr>
+          <p:nvPr/>
+        </p:nvPicPr>
+        <p:blipFill>
+          <a:blip r:embed="rId2">
+            <a:extLst>
+              <a:ext uri="{28A0092B-C50C-407E-A947-70E740481C1C}">
+                <a14:useLocalDpi xmlns:a14="http://schemas.microsoft.com/office/drawing/2010/main" val="0"/>
+              </a:ext>
+            </a:extLst>
+          </a:blip>
+          <a:srcRect/>
+          <a:stretch>
+            <a:fillRect/>
+          </a:stretch>
+        </p:blipFill>
+        <p:spPr bwMode="auto">
+          <a:xfrm>
+            <a:off x="251520" y="188640"/>
+            <a:ext cx="4392488" cy="4392488"/>
+          </a:xfrm>
+          <a:prstGeom prst="ellipse">
+            <a:avLst/>
+          </a:prstGeom>
+          <a:ln>
+            <a:noFill/>
+          </a:ln>
+          <a:effectLst>
+            <a:softEdge rad="112500"/>
+          </a:effectLst>
+          <a:extLst>
+            <a:ext uri="{909E8E84-426E-40DD-AFC4-6F175D3DCCD1}">
+              <a14:hiddenFill xmlns:a14="http://schemas.microsoft.com/office/drawing/2010/main">
+                <a:solidFill>
+                  <a:srgbClr val="FFFFFF"/>
+                </a:solidFill>
+              </a14:hiddenFill>
+            </a:ext>
+          </a:extLst>
+        </p:spPr>
+      </p:pic>
+    </p:spTree>
+    <p:extLst>
+      <p:ext uri="{BB962C8B-B14F-4D97-AF65-F5344CB8AC3E}">
+        <p14:creationId xmlns:p14="http://schemas.microsoft.com/office/powerpoint/2010/main" val="1880291429"/>
+      </p:ext>
+    </p:extLst>
+  </p:cSld>
+  <p:clrMapOvr>
+    <a:masterClrMapping/>
+  </p:clrMapOvr>
+</p:sld>
+</file>
+
 <file path=ppt/theme/theme1.xml><?xml version="1.0" encoding="utf-8"?>
 <a:theme xmlns:a="http://schemas.openxmlformats.org/drawingml/2006/main" name="Tema do Office">
   <a:themeElements>

</xml_diff>